<commit_message>
Fix errors on slides
</commit_message>
<xml_diff>
--- a/lecture-slides/03-Productivity/Git_and_GitHub.pptx
+++ b/lecture-slides/03-Productivity/Git_and_GitHub.pptx
@@ -26,7 +26,7 @@
     <p:sldId id="313" r:id="rId17"/>
     <p:sldId id="305" r:id="rId18"/>
     <p:sldId id="306" r:id="rId19"/>
-    <p:sldId id="309" r:id="rId20"/>
+    <p:sldId id="320" r:id="rId20"/>
     <p:sldId id="314" r:id="rId21"/>
     <p:sldId id="316" r:id="rId22"/>
     <p:sldId id="319" r:id="rId23"/>
@@ -234,7 +234,7 @@
           <a:p>
             <a:fld id="{150A3C78-7347-45C2-948C-AB019D63BD45}" type="datetimeFigureOut">
               <a:rPr lang="en-US" smtClean="0"/>
-              <a:t>9/7/2022</a:t>
+              <a:t>9/8/2022</a:t>
             </a:fld>
             <a:endParaRPr lang="en-US"/>
           </a:p>
@@ -5154,10 +5154,9 @@
           <a:lstStyle/>
           <a:p>
             <a:r>
-              <a:rPr lang="en-US"/>
-              <a:t>Workflow for each assignment</a:t>
-            </a:r>
-            <a:endParaRPr lang="en-US" dirty="0"/>
+              <a:rPr lang="en-US" dirty="0"/>
+              <a:t>Basic workflow (only 1 contributor)</a:t>
+            </a:r>
           </a:p>
         </p:txBody>
       </p:sp>
@@ -5339,8 +5338,8 @@
           </p:nvSpPr>
           <p:spPr>
             <a:xfrm>
-              <a:off x="2886073" y="1879192"/>
-              <a:ext cx="1388744" cy="1015663"/>
+              <a:off x="2886073" y="2036129"/>
+              <a:ext cx="1388744" cy="707886"/>
             </a:xfrm>
             <a:prstGeom prst="rect">
               <a:avLst/>
@@ -5356,7 +5355,7 @@
               <a:pPr algn="ctr"/>
               <a:r>
                 <a:rPr lang="en-US" sz="2000" dirty="0"/>
-                <a:t>Starting assignment repository</a:t>
+                <a:t>Original repository</a:t>
               </a:r>
             </a:p>
           </p:txBody>
@@ -5447,8 +5446,8 @@
           </p:nvSpPr>
           <p:spPr>
             <a:xfrm>
-              <a:off x="2886073" y="3798509"/>
-              <a:ext cx="1388744" cy="1015663"/>
+              <a:off x="2886073" y="3964108"/>
+              <a:ext cx="1388744" cy="707886"/>
             </a:xfrm>
             <a:prstGeom prst="rect">
               <a:avLst/>
@@ -5464,7 +5463,7 @@
               <a:pPr algn="ctr"/>
               <a:r>
                 <a:rPr lang="en-US" sz="2000" dirty="0"/>
-                <a:t>Starting assignment repository</a:t>
+                <a:t>Original repository</a:t>
               </a:r>
             </a:p>
           </p:txBody>
@@ -5560,7 +5559,7 @@
           <p:spPr>
             <a:xfrm flipV="1">
               <a:off x="4274817" y="4306340"/>
-              <a:ext cx="412441" cy="1"/>
+              <a:ext cx="412441" cy="11711"/>
             </a:xfrm>
             <a:prstGeom prst="straightConnector1">
               <a:avLst/>
@@ -5645,8 +5644,8 @@
           </p:nvCxnSpPr>
           <p:spPr>
             <a:xfrm>
-              <a:off x="3580445" y="2894855"/>
-              <a:ext cx="0" cy="903654"/>
+              <a:off x="3580445" y="2744015"/>
+              <a:ext cx="0" cy="1220093"/>
             </a:xfrm>
             <a:prstGeom prst="straightConnector1">
               <a:avLst/>
@@ -6138,7 +6137,7 @@
     </p:spTree>
     <p:extLst>
       <p:ext uri="{BB962C8B-B14F-4D97-AF65-F5344CB8AC3E}">
-        <p14:creationId xmlns:p14="http://schemas.microsoft.com/office/powerpoint/2010/main" val="3070111462"/>
+        <p14:creationId xmlns:p14="http://schemas.microsoft.com/office/powerpoint/2010/main" val="3382872721"/>
       </p:ext>
     </p:extLst>
   </p:cSld>
@@ -8928,7 +8927,7 @@
             <a:pPr lvl="1"/>
             <a:r>
               <a:rPr lang="en-US" dirty="0"/>
-              <a:t>You can submit assignments directly through the GitHub website, but it will end up being harder in many ways</a:t>
+              <a:t>You can make changes directly through the GitHub website, but it will end up being harder in many ways</a:t>
             </a:r>
           </a:p>
           <a:p>

</xml_diff>

<commit_message>
Minor updates to productivity tools
</commit_message>
<xml_diff>
--- a/lecture-slides/03-Productivity/Git_and_GitHub.pptx
+++ b/lecture-slides/03-Productivity/Git_and_GitHub.pptx
@@ -234,7 +234,7 @@
           <a:p>
             <a:fld id="{150A3C78-7347-45C2-948C-AB019D63BD45}" type="datetimeFigureOut">
               <a:rPr lang="en-US" smtClean="0"/>
-              <a:t>9/8/2022</a:t>
+              <a:t>9/6/2023</a:t>
             </a:fld>
             <a:endParaRPr lang="en-US"/>
           </a:p>
@@ -492,7 +492,7 @@
           <a:p>
             <a:fld id="{9AD89F6A-A54B-439D-BEA6-556AFE22494A}" type="datetimeFigureOut">
               <a:rPr lang="en-US" smtClean="0"/>
-              <a:t>9/7/2022</a:t>
+              <a:t>9/6/2023</a:t>
             </a:fld>
             <a:endParaRPr lang="en-US"/>
           </a:p>
@@ -690,7 +690,7 @@
           <a:p>
             <a:fld id="{9AD89F6A-A54B-439D-BEA6-556AFE22494A}" type="datetimeFigureOut">
               <a:rPr lang="en-US" smtClean="0"/>
-              <a:t>9/7/2022</a:t>
+              <a:t>9/6/2023</a:t>
             </a:fld>
             <a:endParaRPr lang="en-US"/>
           </a:p>
@@ -898,7 +898,7 @@
           <a:p>
             <a:fld id="{9AD89F6A-A54B-439D-BEA6-556AFE22494A}" type="datetimeFigureOut">
               <a:rPr lang="en-US" smtClean="0"/>
-              <a:t>9/7/2022</a:t>
+              <a:t>9/6/2023</a:t>
             </a:fld>
             <a:endParaRPr lang="en-US"/>
           </a:p>
@@ -1096,7 +1096,7 @@
           <a:p>
             <a:fld id="{9AD89F6A-A54B-439D-BEA6-556AFE22494A}" type="datetimeFigureOut">
               <a:rPr lang="en-US" smtClean="0"/>
-              <a:t>9/7/2022</a:t>
+              <a:t>9/6/2023</a:t>
             </a:fld>
             <a:endParaRPr lang="en-US"/>
           </a:p>
@@ -1381,7 +1381,7 @@
           <a:p>
             <a:fld id="{9AD89F6A-A54B-439D-BEA6-556AFE22494A}" type="datetimeFigureOut">
               <a:rPr lang="en-US" smtClean="0"/>
-              <a:t>9/7/2022</a:t>
+              <a:t>9/6/2023</a:t>
             </a:fld>
             <a:endParaRPr lang="en-US"/>
           </a:p>
@@ -1646,7 +1646,7 @@
           <a:p>
             <a:fld id="{9AD89F6A-A54B-439D-BEA6-556AFE22494A}" type="datetimeFigureOut">
               <a:rPr lang="en-US" smtClean="0"/>
-              <a:t>9/7/2022</a:t>
+              <a:t>9/6/2023</a:t>
             </a:fld>
             <a:endParaRPr lang="en-US"/>
           </a:p>
@@ -2058,7 +2058,7 @@
           <a:p>
             <a:fld id="{9AD89F6A-A54B-439D-BEA6-556AFE22494A}" type="datetimeFigureOut">
               <a:rPr lang="en-US" smtClean="0"/>
-              <a:t>9/7/2022</a:t>
+              <a:t>9/6/2023</a:t>
             </a:fld>
             <a:endParaRPr lang="en-US"/>
           </a:p>
@@ -2199,7 +2199,7 @@
           <a:p>
             <a:fld id="{9AD89F6A-A54B-439D-BEA6-556AFE22494A}" type="datetimeFigureOut">
               <a:rPr lang="en-US" smtClean="0"/>
-              <a:t>9/7/2022</a:t>
+              <a:t>9/6/2023</a:t>
             </a:fld>
             <a:endParaRPr lang="en-US"/>
           </a:p>
@@ -2312,7 +2312,7 @@
           <a:p>
             <a:fld id="{9AD89F6A-A54B-439D-BEA6-556AFE22494A}" type="datetimeFigureOut">
               <a:rPr lang="en-US" smtClean="0"/>
-              <a:t>9/7/2022</a:t>
+              <a:t>9/6/2023</a:t>
             </a:fld>
             <a:endParaRPr lang="en-US"/>
           </a:p>
@@ -2623,7 +2623,7 @@
           <a:p>
             <a:fld id="{9AD89F6A-A54B-439D-BEA6-556AFE22494A}" type="datetimeFigureOut">
               <a:rPr lang="en-US" smtClean="0"/>
-              <a:t>9/7/2022</a:t>
+              <a:t>9/6/2023</a:t>
             </a:fld>
             <a:endParaRPr lang="en-US"/>
           </a:p>
@@ -2911,7 +2911,7 @@
           <a:p>
             <a:fld id="{9AD89F6A-A54B-439D-BEA6-556AFE22494A}" type="datetimeFigureOut">
               <a:rPr lang="en-US" smtClean="0"/>
-              <a:t>9/7/2022</a:t>
+              <a:t>9/6/2023</a:t>
             </a:fld>
             <a:endParaRPr lang="en-US"/>
           </a:p>
@@ -3152,7 +3152,7 @@
           <a:p>
             <a:fld id="{9AD89F6A-A54B-439D-BEA6-556AFE22494A}" type="datetimeFigureOut">
               <a:rPr lang="en-US" smtClean="0"/>
-              <a:t>9/7/2022</a:t>
+              <a:t>9/6/2023</a:t>
             </a:fld>
             <a:endParaRPr lang="en-US"/>
           </a:p>
@@ -4270,7 +4270,7 @@
           <a:p>
             <a:r>
               <a:rPr lang="en-US" dirty="0"/>
-              <a:t>3. Do the assignment (edit the repo)</a:t>
+              <a:t>3. Work on your project (edit the repo)</a:t>
             </a:r>
           </a:p>
         </p:txBody>
@@ -7981,11 +7981,11 @@
           <a:p>
             <a:r>
               <a:rPr lang="en-US" b="1" dirty="0"/>
-              <a:t>Push </a:t>
-            </a:r>
-            <a:r>
-              <a:rPr lang="en-US" dirty="0"/>
-              <a:t>to merge their changes with yours</a:t>
+              <a:t>Pull </a:t>
+            </a:r>
+            <a:r>
+              <a:rPr lang="en-US" dirty="0"/>
+              <a:t>to download their changes</a:t>
             </a:r>
           </a:p>
           <a:p>
@@ -8361,7 +8361,7 @@
             </a:pPr>
             <a:r>
               <a:rPr lang="en-US" dirty="0"/>
-              <a:t>Save each new set of changes sequentially</a:t>
+              <a:t>Saves each new set of changes sequentially</a:t>
             </a:r>
           </a:p>
           <a:p>
@@ -8371,7 +8371,7 @@
             </a:pPr>
             <a:r>
               <a:rPr lang="en-US" dirty="0"/>
-              <a:t>Keep track of different versions of a document/project</a:t>
+              <a:t>Keeps track of different versions of a document/project</a:t>
             </a:r>
           </a:p>
           <a:p>
@@ -8381,7 +8381,7 @@
             </a:pPr>
             <a:r>
               <a:rPr lang="en-US" dirty="0"/>
-              <a:t>Merge changes from multiple versions</a:t>
+              <a:t>Able to merge changes from multiple versions</a:t>
             </a:r>
           </a:p>
           <a:p>
@@ -8437,7 +8437,7 @@
           <a:p>
             <a:r>
               <a:rPr lang="en-US" dirty="0"/>
-              <a:t>The gold standard in the private sector – used EVERYWHERE</a:t>
+              <a:t>The gold standard in the tech sector – used EVERYWHERE</a:t>
             </a:r>
           </a:p>
         </p:txBody>

</xml_diff>

<commit_message>
Update Wrangling for current tidyverse syntax; update dates throughout
</commit_message>
<xml_diff>
--- a/lecture-slides/03-Productivity/Git_and_GitHub.pptx
+++ b/lecture-slides/03-Productivity/Git_and_GitHub.pptx
@@ -234,7 +234,7 @@
           <a:p>
             <a:fld id="{150A3C78-7347-45C2-948C-AB019D63BD45}" type="datetimeFigureOut">
               <a:rPr lang="en-US" smtClean="0"/>
-              <a:t>9/6/2023</a:t>
+              <a:t>9/11/2023</a:t>
             </a:fld>
             <a:endParaRPr lang="en-US"/>
           </a:p>
@@ -492,7 +492,7 @@
           <a:p>
             <a:fld id="{9AD89F6A-A54B-439D-BEA6-556AFE22494A}" type="datetimeFigureOut">
               <a:rPr lang="en-US" smtClean="0"/>
-              <a:t>9/6/2023</a:t>
+              <a:t>9/11/2023</a:t>
             </a:fld>
             <a:endParaRPr lang="en-US"/>
           </a:p>
@@ -690,7 +690,7 @@
           <a:p>
             <a:fld id="{9AD89F6A-A54B-439D-BEA6-556AFE22494A}" type="datetimeFigureOut">
               <a:rPr lang="en-US" smtClean="0"/>
-              <a:t>9/6/2023</a:t>
+              <a:t>9/11/2023</a:t>
             </a:fld>
             <a:endParaRPr lang="en-US"/>
           </a:p>
@@ -898,7 +898,7 @@
           <a:p>
             <a:fld id="{9AD89F6A-A54B-439D-BEA6-556AFE22494A}" type="datetimeFigureOut">
               <a:rPr lang="en-US" smtClean="0"/>
-              <a:t>9/6/2023</a:t>
+              <a:t>9/11/2023</a:t>
             </a:fld>
             <a:endParaRPr lang="en-US"/>
           </a:p>
@@ -1096,7 +1096,7 @@
           <a:p>
             <a:fld id="{9AD89F6A-A54B-439D-BEA6-556AFE22494A}" type="datetimeFigureOut">
               <a:rPr lang="en-US" smtClean="0"/>
-              <a:t>9/6/2023</a:t>
+              <a:t>9/11/2023</a:t>
             </a:fld>
             <a:endParaRPr lang="en-US"/>
           </a:p>
@@ -1381,7 +1381,7 @@
           <a:p>
             <a:fld id="{9AD89F6A-A54B-439D-BEA6-556AFE22494A}" type="datetimeFigureOut">
               <a:rPr lang="en-US" smtClean="0"/>
-              <a:t>9/6/2023</a:t>
+              <a:t>9/11/2023</a:t>
             </a:fld>
             <a:endParaRPr lang="en-US"/>
           </a:p>
@@ -1646,7 +1646,7 @@
           <a:p>
             <a:fld id="{9AD89F6A-A54B-439D-BEA6-556AFE22494A}" type="datetimeFigureOut">
               <a:rPr lang="en-US" smtClean="0"/>
-              <a:t>9/6/2023</a:t>
+              <a:t>9/11/2023</a:t>
             </a:fld>
             <a:endParaRPr lang="en-US"/>
           </a:p>
@@ -2058,7 +2058,7 @@
           <a:p>
             <a:fld id="{9AD89F6A-A54B-439D-BEA6-556AFE22494A}" type="datetimeFigureOut">
               <a:rPr lang="en-US" smtClean="0"/>
-              <a:t>9/6/2023</a:t>
+              <a:t>9/11/2023</a:t>
             </a:fld>
             <a:endParaRPr lang="en-US"/>
           </a:p>
@@ -2199,7 +2199,7 @@
           <a:p>
             <a:fld id="{9AD89F6A-A54B-439D-BEA6-556AFE22494A}" type="datetimeFigureOut">
               <a:rPr lang="en-US" smtClean="0"/>
-              <a:t>9/6/2023</a:t>
+              <a:t>9/11/2023</a:t>
             </a:fld>
             <a:endParaRPr lang="en-US"/>
           </a:p>
@@ -2312,7 +2312,7 @@
           <a:p>
             <a:fld id="{9AD89F6A-A54B-439D-BEA6-556AFE22494A}" type="datetimeFigureOut">
               <a:rPr lang="en-US" smtClean="0"/>
-              <a:t>9/6/2023</a:t>
+              <a:t>9/11/2023</a:t>
             </a:fld>
             <a:endParaRPr lang="en-US"/>
           </a:p>
@@ -2623,7 +2623,7 @@
           <a:p>
             <a:fld id="{9AD89F6A-A54B-439D-BEA6-556AFE22494A}" type="datetimeFigureOut">
               <a:rPr lang="en-US" smtClean="0"/>
-              <a:t>9/6/2023</a:t>
+              <a:t>9/11/2023</a:t>
             </a:fld>
             <a:endParaRPr lang="en-US"/>
           </a:p>
@@ -2911,7 +2911,7 @@
           <a:p>
             <a:fld id="{9AD89F6A-A54B-439D-BEA6-556AFE22494A}" type="datetimeFigureOut">
               <a:rPr lang="en-US" smtClean="0"/>
-              <a:t>9/6/2023</a:t>
+              <a:t>9/11/2023</a:t>
             </a:fld>
             <a:endParaRPr lang="en-US"/>
           </a:p>
@@ -3152,7 +3152,7 @@
           <a:p>
             <a:fld id="{9AD89F6A-A54B-439D-BEA6-556AFE22494A}" type="datetimeFigureOut">
               <a:rPr lang="en-US" smtClean="0"/>
-              <a:t>9/6/2023</a:t>
+              <a:t>9/11/2023</a:t>
             </a:fld>
             <a:endParaRPr lang="en-US"/>
           </a:p>
@@ -8431,7 +8431,7 @@
             <a:pPr lvl="1"/>
             <a:r>
               <a:rPr lang="en-US" dirty="0"/>
-              <a:t>But critical to avoid disaster when collaborating</a:t>
+              <a:t>But critical to avoid disaster when collaborating on complex projects</a:t>
             </a:r>
           </a:p>
           <a:p>
@@ -8525,11 +8525,11 @@
           <a:p>
             <a:r>
               <a:rPr lang="en-US" dirty="0"/>
-              <a:t>GitHub is a </a:t>
+              <a:t>GitHub is a specific</a:t>
             </a:r>
             <a:r>
               <a:rPr lang="en-US" b="1" dirty="0"/>
-              <a:t>specific website </a:t>
+              <a:t> website </a:t>
             </a:r>
             <a:r>
               <a:rPr lang="en-US" dirty="0"/>
@@ -8690,7 +8690,7 @@
             </a:pPr>
             <a:r>
               <a:rPr lang="en-US" dirty="0"/>
-              <a:t>Create a GitHub account (unless you already have one)</a:t>
+              <a:t>Create a GitHub account</a:t>
             </a:r>
           </a:p>
           <a:p>
@@ -8794,6 +8794,15 @@
           <a:bodyPr/>
           <a:lstStyle/>
           <a:p>
+            <a:pPr marL="0" indent="0">
+              <a:buNone/>
+            </a:pPr>
+            <a:r>
+              <a:rPr lang="en-US" dirty="0"/>
+              <a:t>If you don’t already have one:</a:t>
+            </a:r>
+          </a:p>
+          <a:p>
             <a:r>
               <a:rPr lang="en-US" dirty="0"/>
               <a:t>Go here and fill out the forms: </a:t>
@@ -8810,9 +8819,19 @@
             <a:endParaRPr lang="en-US" dirty="0"/>
           </a:p>
           <a:p>
-            <a:r>
-              <a:rPr lang="en-US" dirty="0"/>
-              <a:t>No need to apply for the GitHub Student benefits (though you can if you want to)</a:t>
+            <a:pPr marL="0" indent="0">
+              <a:buNone/>
+            </a:pPr>
+            <a:r>
+              <a:rPr lang="en-US" dirty="0"/>
+              <a:t>No need to apply for the GitHub Student benefits</a:t>
+            </a:r>
+            <a:br>
+              <a:rPr lang="en-US" dirty="0"/>
+            </a:br>
+            <a:r>
+              <a:rPr lang="en-US" dirty="0"/>
+              <a:t>(though you can if you want to)</a:t>
             </a:r>
           </a:p>
         </p:txBody>

</xml_diff>